<commit_message>
added notebooks to slides
</commit_message>
<xml_diff>
--- a/Day1Slides.pptx
+++ b/Day1Slides.pptx
@@ -3362,6 +3362,20 @@
               </a:rPr>
               <a:t>sortEmails.ipynb</a:t>
             </a:r>
+            <a:r>
+              <a:rPr lang="en-US" dirty="0">
+                <a:latin typeface="Cordia New" panose="020B0304020202020204" pitchFamily="34" charset="-34"/>
+                <a:cs typeface="Cordia New" panose="020B0304020202020204" pitchFamily="34" charset="-34"/>
+              </a:rPr>
+              <a:t> </a:t>
+            </a:r>
+            <a:r>
+              <a:rPr lang="en-US">
+                <a:latin typeface="Cordia New" panose="020B0304020202020204" pitchFamily="34" charset="-34"/>
+                <a:cs typeface="Cordia New" panose="020B0304020202020204" pitchFamily="34" charset="-34"/>
+              </a:rPr>
+              <a:t>and sortEmails2.ipynb</a:t>
+            </a:r>
             <a:endParaRPr lang="en-US" dirty="0">
               <a:latin typeface="Cordia New" panose="020B0304020202020204" pitchFamily="34" charset="-34"/>
               <a:cs typeface="Cordia New" panose="020B0304020202020204" pitchFamily="34" charset="-34"/>

</xml_diff>